<commit_message>
Update on code, readme, ppt
</commit_message>
<xml_diff>
--- a/ppt/Assignment_A1-1_Presentation.pptx
+++ b/ppt/Assignment_A1-1_Presentation.pptx
@@ -5,15 +5,16 @@
     <p:sldMasterId id="2147484005" r:id="rId1"/>
   </p:sldMasterIdLst>
   <p:sldIdLst>
-    <p:sldId id="256" r:id="rId2"/>
+    <p:sldId id="265" r:id="rId2"/>
     <p:sldId id="261" r:id="rId3"/>
-    <p:sldId id="257" r:id="rId4"/>
-    <p:sldId id="258" r:id="rId5"/>
-    <p:sldId id="259" r:id="rId6"/>
-    <p:sldId id="263" r:id="rId7"/>
-    <p:sldId id="260" r:id="rId8"/>
-    <p:sldId id="262" r:id="rId9"/>
-    <p:sldId id="264" r:id="rId10"/>
+    <p:sldId id="256" r:id="rId4"/>
+    <p:sldId id="257" r:id="rId5"/>
+    <p:sldId id="258" r:id="rId6"/>
+    <p:sldId id="259" r:id="rId7"/>
+    <p:sldId id="263" r:id="rId8"/>
+    <p:sldId id="260" r:id="rId9"/>
+    <p:sldId id="262" r:id="rId10"/>
+    <p:sldId id="264" r:id="rId11"/>
   </p:sldIdLst>
   <p:sldSz cx="12192000" cy="6858000"/>
   <p:notesSz cx="6858000" cy="9144000"/>
@@ -296,7 +297,7 @@
           <a:p>
             <a:fld id="{E2237694-747B-429D-BAB8-A0D65AE46555}" type="datetimeFigureOut">
               <a:rPr lang="en-AU" smtClean="0"/>
-              <a:t>5/9/18</a:t>
+              <a:t>6/9/18</a:t>
             </a:fld>
             <a:endParaRPr lang="en-AU"/>
           </a:p>
@@ -466,7 +467,7 @@
           <a:p>
             <a:fld id="{E2237694-747B-429D-BAB8-A0D65AE46555}" type="datetimeFigureOut">
               <a:rPr lang="en-AU" smtClean="0"/>
-              <a:t>5/9/18</a:t>
+              <a:t>6/9/18</a:t>
             </a:fld>
             <a:endParaRPr lang="en-AU"/>
           </a:p>
@@ -646,7 +647,7 @@
           <a:p>
             <a:fld id="{E2237694-747B-429D-BAB8-A0D65AE46555}" type="datetimeFigureOut">
               <a:rPr lang="en-AU" smtClean="0"/>
-              <a:t>5/9/18</a:t>
+              <a:t>6/9/18</a:t>
             </a:fld>
             <a:endParaRPr lang="en-AU"/>
           </a:p>
@@ -816,7 +817,7 @@
           <a:p>
             <a:fld id="{E2237694-747B-429D-BAB8-A0D65AE46555}" type="datetimeFigureOut">
               <a:rPr lang="en-AU" smtClean="0"/>
-              <a:t>5/9/18</a:t>
+              <a:t>6/9/18</a:t>
             </a:fld>
             <a:endParaRPr lang="en-AU"/>
           </a:p>
@@ -1062,7 +1063,7 @@
           <a:p>
             <a:fld id="{E2237694-747B-429D-BAB8-A0D65AE46555}" type="datetimeFigureOut">
               <a:rPr lang="en-AU" smtClean="0"/>
-              <a:t>5/9/18</a:t>
+              <a:t>6/9/18</a:t>
             </a:fld>
             <a:endParaRPr lang="en-AU"/>
           </a:p>
@@ -1350,7 +1351,7 @@
           <a:p>
             <a:fld id="{E2237694-747B-429D-BAB8-A0D65AE46555}" type="datetimeFigureOut">
               <a:rPr lang="en-AU" smtClean="0"/>
-              <a:t>5/9/18</a:t>
+              <a:t>6/9/18</a:t>
             </a:fld>
             <a:endParaRPr lang="en-AU"/>
           </a:p>
@@ -1772,7 +1773,7 @@
           <a:p>
             <a:fld id="{E2237694-747B-429D-BAB8-A0D65AE46555}" type="datetimeFigureOut">
               <a:rPr lang="en-AU" smtClean="0"/>
-              <a:t>5/9/18</a:t>
+              <a:t>6/9/18</a:t>
             </a:fld>
             <a:endParaRPr lang="en-AU"/>
           </a:p>
@@ -1890,7 +1891,7 @@
           <a:p>
             <a:fld id="{E2237694-747B-429D-BAB8-A0D65AE46555}" type="datetimeFigureOut">
               <a:rPr lang="en-AU" smtClean="0"/>
-              <a:t>5/9/18</a:t>
+              <a:t>6/9/18</a:t>
             </a:fld>
             <a:endParaRPr lang="en-AU"/>
           </a:p>
@@ -1985,7 +1986,7 @@
           <a:p>
             <a:fld id="{E2237694-747B-429D-BAB8-A0D65AE46555}" type="datetimeFigureOut">
               <a:rPr lang="en-AU" smtClean="0"/>
-              <a:t>5/9/18</a:t>
+              <a:t>6/9/18</a:t>
             </a:fld>
             <a:endParaRPr lang="en-AU"/>
           </a:p>
@@ -2262,7 +2263,7 @@
           <a:p>
             <a:fld id="{E2237694-747B-429D-BAB8-A0D65AE46555}" type="datetimeFigureOut">
               <a:rPr lang="en-AU" smtClean="0"/>
-              <a:t>5/9/18</a:t>
+              <a:t>6/9/18</a:t>
             </a:fld>
             <a:endParaRPr lang="en-AU"/>
           </a:p>
@@ -2515,7 +2516,7 @@
           <a:p>
             <a:fld id="{E2237694-747B-429D-BAB8-A0D65AE46555}" type="datetimeFigureOut">
               <a:rPr lang="en-AU" smtClean="0"/>
-              <a:t>5/9/18</a:t>
+              <a:t>6/9/18</a:t>
             </a:fld>
             <a:endParaRPr lang="en-AU"/>
           </a:p>
@@ -2728,7 +2729,7 @@
           <a:p>
             <a:fld id="{E2237694-747B-429D-BAB8-A0D65AE46555}" type="datetimeFigureOut">
               <a:rPr lang="en-AU" smtClean="0"/>
-              <a:t>5/9/18</a:t>
+              <a:t>6/9/18</a:t>
             </a:fld>
             <a:endParaRPr lang="en-AU"/>
           </a:p>
@@ -3105,13 +3106,7 @@
       </p:grpSpPr>
       <p:sp>
         <p:nvSpPr>
-          <p:cNvPr id="2" name="Title 1">
-            <a:extLst>
-              <a:ext uri="{FF2B5EF4-FFF2-40B4-BE49-F238E27FC236}">
-                <a16:creationId xmlns="" xmlns:a16="http://schemas.microsoft.com/office/drawing/2014/main" id="{8F5451DC-123F-4B99-AADD-9B976F5E8DE6}"/>
-              </a:ext>
-            </a:extLst>
-          </p:cNvPr>
+          <p:cNvPr id="2" name="Title 1"/>
           <p:cNvSpPr>
             <a:spLocks noGrp="1"/>
           </p:cNvSpPr>
@@ -3119,34 +3114,18 @@
             <p:ph type="ctrTitle"/>
           </p:nvPr>
         </p:nvSpPr>
-        <p:spPr>
-          <a:xfrm>
-            <a:off x="1751012" y="1320800"/>
-            <a:ext cx="8689976" cy="2489198"/>
-          </a:xfrm>
-        </p:spPr>
-        <p:txBody>
-          <a:bodyPr>
-            <a:normAutofit/>
-          </a:bodyPr>
-          <a:lstStyle/>
-          <a:p>
-            <a:r>
-              <a:rPr lang="en-AU" sz="7200" dirty="0"/>
-              <a:t>Exercise Log App</a:t>
-            </a:r>
-          </a:p>
-        </p:txBody>
-      </p:sp>
-      <p:sp>
-        <p:nvSpPr>
-          <p:cNvPr id="3" name="Subtitle 2">
-            <a:extLst>
-              <a:ext uri="{FF2B5EF4-FFF2-40B4-BE49-F238E27FC236}">
-                <a16:creationId xmlns="" xmlns:a16="http://schemas.microsoft.com/office/drawing/2014/main" id="{DFE00943-9AFC-4A15-B898-4ED3EB920C7B}"/>
-              </a:ext>
-            </a:extLst>
-          </p:cNvPr>
+        <p:spPr/>
+        <p:txBody>
+          <a:bodyPr/>
+          <a:lstStyle/>
+          <a:p>
+            <a:endParaRPr lang="en-US"/>
+          </a:p>
+        </p:txBody>
+      </p:sp>
+      <p:sp>
+        <p:nvSpPr>
+          <p:cNvPr id="3" name="Subtitle 2"/>
           <p:cNvSpPr>
             <a:spLocks noGrp="1"/>
           </p:cNvSpPr>
@@ -3156,30 +3135,89 @@
         </p:nvSpPr>
         <p:spPr/>
         <p:txBody>
-          <a:bodyPr>
-            <a:normAutofit/>
-          </a:bodyPr>
-          <a:lstStyle/>
-          <a:p>
-            <a:r>
-              <a:rPr lang="en-AU" sz="2800" dirty="0"/>
-              <a:t>By Mark </a:t>
-            </a:r>
-            <a:r>
-              <a:rPr lang="en-AU" sz="2800" dirty="0" err="1"/>
-              <a:t>Conanan</a:t>
-            </a:r>
-            <a:r>
-              <a:rPr lang="en-AU" sz="2800" dirty="0"/>
-              <a:t> and Thanh Dao</a:t>
-            </a:r>
+          <a:bodyPr/>
+          <a:lstStyle/>
+          <a:p>
+            <a:endParaRPr lang="en-US"/>
           </a:p>
         </p:txBody>
       </p:sp>
     </p:spTree>
     <p:extLst>
       <p:ext uri="{BB962C8B-B14F-4D97-AF65-F5344CB8AC3E}">
-        <p14:creationId xmlns:p14="http://schemas.microsoft.com/office/powerpoint/2010/main" val="2611525835"/>
+        <p14:creationId xmlns:p14="http://schemas.microsoft.com/office/powerpoint/2010/main" val="4276620706"/>
+      </p:ext>
+    </p:extLst>
+  </p:cSld>
+  <p:clrMapOvr>
+    <a:masterClrMapping/>
+  </p:clrMapOvr>
+</p:sld>
+</file>
+
+<file path=ppt/slides/slide10.xml><?xml version="1.0" encoding="utf-8"?>
+<p:sld xmlns:a="http://schemas.openxmlformats.org/drawingml/2006/main" xmlns:r="http://schemas.openxmlformats.org/officeDocument/2006/relationships" xmlns:p="http://schemas.openxmlformats.org/presentationml/2006/main">
+  <p:cSld>
+    <p:spTree>
+      <p:nvGrpSpPr>
+        <p:cNvPr id="1" name=""/>
+        <p:cNvGrpSpPr/>
+        <p:nvPr/>
+      </p:nvGrpSpPr>
+      <p:grpSpPr>
+        <a:xfrm>
+          <a:off x="0" y="0"/>
+          <a:ext cx="0" cy="0"/>
+          <a:chOff x="0" y="0"/>
+          <a:chExt cx="0" cy="0"/>
+        </a:xfrm>
+      </p:grpSpPr>
+      <p:sp>
+        <p:nvSpPr>
+          <p:cNvPr id="2" name="Title 1"/>
+          <p:cNvSpPr>
+            <a:spLocks noGrp="1"/>
+          </p:cNvSpPr>
+          <p:nvPr>
+            <p:ph type="title"/>
+          </p:nvPr>
+        </p:nvSpPr>
+        <p:spPr/>
+        <p:txBody>
+          <a:bodyPr/>
+          <a:lstStyle/>
+          <a:p>
+            <a:r>
+              <a:rPr lang="en-US" dirty="0" smtClean="0"/>
+              <a:t>Any Questions</a:t>
+            </a:r>
+            <a:endParaRPr lang="en-US" dirty="0"/>
+          </a:p>
+        </p:txBody>
+      </p:sp>
+      <p:sp>
+        <p:nvSpPr>
+          <p:cNvPr id="3" name="Content Placeholder 2"/>
+          <p:cNvSpPr>
+            <a:spLocks noGrp="1"/>
+          </p:cNvSpPr>
+          <p:nvPr>
+            <p:ph idx="1"/>
+          </p:nvPr>
+        </p:nvSpPr>
+        <p:spPr/>
+        <p:txBody>
+          <a:bodyPr/>
+          <a:lstStyle/>
+          <a:p>
+            <a:endParaRPr lang="en-US"/>
+          </a:p>
+        </p:txBody>
+      </p:sp>
+    </p:spTree>
+    <p:extLst>
+      <p:ext uri="{BB962C8B-B14F-4D97-AF65-F5344CB8AC3E}">
+        <p14:creationId xmlns:p14="http://schemas.microsoft.com/office/powerpoint/2010/main" val="2288286935"/>
       </p:ext>
     </p:extLst>
   </p:cSld>
@@ -3271,7 +3309,7 @@
           <p:cNvPr id="2" name="Title 1">
             <a:extLst>
               <a:ext uri="{FF2B5EF4-FFF2-40B4-BE49-F238E27FC236}">
-                <a16:creationId xmlns="" xmlns:a16="http://schemas.microsoft.com/office/drawing/2014/main" id="{FBDF1499-9B27-4AD3-8696-4CF5318FB7EC}"/>
+                <a16:creationId xmlns="" xmlns:a16="http://schemas.microsoft.com/office/drawing/2014/main" id="{8F5451DC-123F-4B99-AADD-9B976F5E8DE6}"/>
               </a:ext>
             </a:extLst>
           </p:cNvPr>
@@ -3279,36 +3317,34 @@
             <a:spLocks noGrp="1"/>
           </p:cNvSpPr>
           <p:nvPr>
-            <p:ph type="title"/>
+            <p:ph type="ctrTitle"/>
           </p:nvPr>
         </p:nvSpPr>
         <p:spPr>
           <a:xfrm>
-            <a:off x="913776" y="175172"/>
-            <a:ext cx="10364451" cy="1596177"/>
+            <a:off x="1751012" y="1320800"/>
+            <a:ext cx="8689976" cy="2489198"/>
           </a:xfrm>
         </p:spPr>
         <p:txBody>
-          <a:bodyPr/>
+          <a:bodyPr>
+            <a:normAutofit/>
+          </a:bodyPr>
           <a:lstStyle/>
           <a:p>
             <a:r>
               <a:rPr lang="en-AU" sz="7200" dirty="0"/>
-              <a:t>Purpose</a:t>
-            </a:r>
-            <a:r>
-              <a:rPr lang="en-AU" dirty="0"/>
-              <a:t> </a:t>
-            </a:r>
-          </a:p>
-        </p:txBody>
-      </p:sp>
-      <p:sp>
-        <p:nvSpPr>
-          <p:cNvPr id="3" name="Content Placeholder 2">
+              <a:t>Exercise Log App</a:t>
+            </a:r>
+          </a:p>
+        </p:txBody>
+      </p:sp>
+      <p:sp>
+        <p:nvSpPr>
+          <p:cNvPr id="3" name="Subtitle 2">
             <a:extLst>
               <a:ext uri="{FF2B5EF4-FFF2-40B4-BE49-F238E27FC236}">
-                <a16:creationId xmlns="" xmlns:a16="http://schemas.microsoft.com/office/drawing/2014/main" id="{A585A246-4F93-4300-8905-CB2332A411EA}"/>
+                <a16:creationId xmlns="" xmlns:a16="http://schemas.microsoft.com/office/drawing/2014/main" id="{DFE00943-9AFC-4A15-B898-4ED3EB920C7B}"/>
               </a:ext>
             </a:extLst>
           </p:cNvPr>
@@ -3316,46 +3352,31 @@
             <a:spLocks noGrp="1"/>
           </p:cNvSpPr>
           <p:nvPr>
-            <p:ph idx="1"/>
+            <p:ph type="subTitle" idx="1"/>
           </p:nvPr>
         </p:nvSpPr>
         <p:spPr/>
         <p:txBody>
           <a:bodyPr>
-            <a:noAutofit/>
+            <a:normAutofit/>
           </a:bodyPr>
           <a:lstStyle/>
           <a:p>
             <a:r>
-              <a:rPr lang="en-AU" sz="4800" dirty="0"/>
-              <a:t>To track the progress of the user during a workout in a easy to read table</a:t>
-            </a:r>
-          </a:p>
-          <a:p>
-            <a:r>
-              <a:rPr lang="en-AU" sz="4800" dirty="0"/>
-              <a:t>To encourage people </a:t>
-            </a:r>
-            <a:r>
-              <a:rPr lang="en-AU" sz="4800" dirty="0" smtClean="0"/>
-              <a:t>during their workout</a:t>
-            </a:r>
-            <a:endParaRPr lang="en-AU" sz="4800" dirty="0"/>
-          </a:p>
-          <a:p>
-            <a:pPr marL="0" indent="0">
-              <a:buNone/>
-            </a:pPr>
-            <a:r>
-              <a:rPr lang="en-AU" sz="4400" dirty="0"/>
-              <a:t/>
-            </a:r>
-            <a:br>
-              <a:rPr lang="en-AU" sz="4400" dirty="0"/>
-            </a:br>
-            <a:r>
-              <a:rPr lang="en-AU" sz="4400" dirty="0"/>
-              <a:t> </a:t>
+              <a:rPr lang="en-AU" sz="2800" dirty="0" smtClean="0"/>
+              <a:t>Developed by </a:t>
+            </a:r>
+            <a:r>
+              <a:rPr lang="en-AU" sz="2800" dirty="0"/>
+              <a:t>Mark </a:t>
+            </a:r>
+            <a:r>
+              <a:rPr lang="en-AU" sz="2800" dirty="0" err="1"/>
+              <a:t>Conanan</a:t>
+            </a:r>
+            <a:r>
+              <a:rPr lang="en-AU" sz="2800" dirty="0"/>
+              <a:t> and Thanh Dao</a:t>
             </a:r>
           </a:p>
         </p:txBody>
@@ -3363,7 +3384,7 @@
     </p:spTree>
     <p:extLst>
       <p:ext uri="{BB962C8B-B14F-4D97-AF65-F5344CB8AC3E}">
-        <p14:creationId xmlns:p14="http://schemas.microsoft.com/office/powerpoint/2010/main" val="68997354"/>
+        <p14:creationId xmlns:p14="http://schemas.microsoft.com/office/powerpoint/2010/main" val="2611525835"/>
       </p:ext>
     </p:extLst>
   </p:cSld>
@@ -3395,7 +3416,7 @@
           <p:cNvPr id="2" name="Title 1">
             <a:extLst>
               <a:ext uri="{FF2B5EF4-FFF2-40B4-BE49-F238E27FC236}">
-                <a16:creationId xmlns="" xmlns:a16="http://schemas.microsoft.com/office/drawing/2014/main" id="{1E118303-EB12-4E60-AC63-F70BFC9CD066}"/>
+                <a16:creationId xmlns="" xmlns:a16="http://schemas.microsoft.com/office/drawing/2014/main" id="{FBDF1499-9B27-4AD3-8696-4CF5318FB7EC}"/>
               </a:ext>
             </a:extLst>
           </p:cNvPr>
@@ -3406,16 +3427,23 @@
             <p:ph type="title"/>
           </p:nvPr>
         </p:nvSpPr>
-        <p:spPr/>
-        <p:txBody>
-          <a:bodyPr>
-            <a:normAutofit fontScale="90000"/>
-          </a:bodyPr>
+        <p:spPr>
+          <a:xfrm>
+            <a:off x="913776" y="175172"/>
+            <a:ext cx="10364451" cy="1596177"/>
+          </a:xfrm>
+        </p:spPr>
+        <p:txBody>
+          <a:bodyPr/>
           <a:lstStyle/>
           <a:p>
             <a:r>
               <a:rPr lang="en-AU" sz="7200" dirty="0"/>
-              <a:t>Prerequisites</a:t>
+              <a:t>Purpose</a:t>
+            </a:r>
+            <a:r>
+              <a:rPr lang="en-AU" dirty="0"/>
+              <a:t> </a:t>
             </a:r>
           </a:p>
         </p:txBody>
@@ -3425,7 +3453,7 @@
           <p:cNvPr id="3" name="Content Placeholder 2">
             <a:extLst>
               <a:ext uri="{FF2B5EF4-FFF2-40B4-BE49-F238E27FC236}">
-                <a16:creationId xmlns="" xmlns:a16="http://schemas.microsoft.com/office/drawing/2014/main" id="{EC145A38-FEC7-43D7-AC36-DBFC25A5F973}"/>
+                <a16:creationId xmlns="" xmlns:a16="http://schemas.microsoft.com/office/drawing/2014/main" id="{A585A246-4F93-4300-8905-CB2332A411EA}"/>
               </a:ext>
             </a:extLst>
           </p:cNvPr>
@@ -3439,27 +3467,40 @@
         <p:spPr/>
         <p:txBody>
           <a:bodyPr>
-            <a:normAutofit/>
+            <a:noAutofit/>
           </a:bodyPr>
           <a:lstStyle/>
           <a:p>
             <a:r>
               <a:rPr lang="en-AU" sz="2800" dirty="0"/>
-              <a:t>Fork and clone repository ‘https://github.com/markconanan/</a:t>
-            </a:r>
-            <a:r>
-              <a:rPr lang="en-AU" sz="2800" dirty="0" err="1"/>
-              <a:t>CA_Assessment</a:t>
-            </a:r>
+              <a:t>To track the progress of the user during a workout in a easy to read table</a:t>
+            </a:r>
+          </a:p>
+          <a:p>
             <a:r>
               <a:rPr lang="en-AU" sz="2800" dirty="0"/>
-              <a:t>’</a:t>
-            </a:r>
-          </a:p>
-          <a:p>
+              <a:t>To encourage people </a:t>
+            </a:r>
+            <a:r>
+              <a:rPr lang="en-AU" sz="2800" dirty="0" smtClean="0"/>
+              <a:t>during their workout</a:t>
+            </a:r>
+            <a:endParaRPr lang="en-AU" sz="2800" dirty="0"/>
+          </a:p>
+          <a:p>
+            <a:pPr marL="0" indent="0">
+              <a:buNone/>
+            </a:pPr>
             <a:r>
               <a:rPr lang="en-AU" sz="2800" dirty="0"/>
-              <a:t>Need to install ‘terminal-table’ gem</a:t>
+              <a:t/>
+            </a:r>
+            <a:br>
+              <a:rPr lang="en-AU" sz="2800" dirty="0"/>
+            </a:br>
+            <a:r>
+              <a:rPr lang="en-AU" sz="2800" dirty="0"/>
+              <a:t> </a:t>
             </a:r>
           </a:p>
         </p:txBody>
@@ -3467,7 +3508,7 @@
     </p:spTree>
     <p:extLst>
       <p:ext uri="{BB962C8B-B14F-4D97-AF65-F5344CB8AC3E}">
-        <p14:creationId xmlns:p14="http://schemas.microsoft.com/office/powerpoint/2010/main" val="2273243620"/>
+        <p14:creationId xmlns:p14="http://schemas.microsoft.com/office/powerpoint/2010/main" val="68997354"/>
       </p:ext>
     </p:extLst>
   </p:cSld>
@@ -3499,7 +3540,7 @@
           <p:cNvPr id="2" name="Title 1">
             <a:extLst>
               <a:ext uri="{FF2B5EF4-FFF2-40B4-BE49-F238E27FC236}">
-                <a16:creationId xmlns="" xmlns:a16="http://schemas.microsoft.com/office/drawing/2014/main" id="{25788A04-8D3D-40BB-ACCE-661ADB19BE80}"/>
+                <a16:creationId xmlns="" xmlns:a16="http://schemas.microsoft.com/office/drawing/2014/main" id="{1E118303-EB12-4E60-AC63-F70BFC9CD066}"/>
               </a:ext>
             </a:extLst>
           </p:cNvPr>
@@ -3510,12 +3551,37 @@
             <p:ph type="title"/>
           </p:nvPr>
         </p:nvSpPr>
-        <p:spPr>
-          <a:xfrm>
-            <a:off x="913774" y="0"/>
-            <a:ext cx="10364451" cy="1596177"/>
-          </a:xfrm>
-        </p:spPr>
+        <p:spPr/>
+        <p:txBody>
+          <a:bodyPr>
+            <a:normAutofit fontScale="90000"/>
+          </a:bodyPr>
+          <a:lstStyle/>
+          <a:p>
+            <a:r>
+              <a:rPr lang="en-AU" sz="7200" dirty="0"/>
+              <a:t>Prerequisites</a:t>
+            </a:r>
+          </a:p>
+        </p:txBody>
+      </p:sp>
+      <p:sp>
+        <p:nvSpPr>
+          <p:cNvPr id="3" name="Content Placeholder 2">
+            <a:extLst>
+              <a:ext uri="{FF2B5EF4-FFF2-40B4-BE49-F238E27FC236}">
+                <a16:creationId xmlns="" xmlns:a16="http://schemas.microsoft.com/office/drawing/2014/main" id="{EC145A38-FEC7-43D7-AC36-DBFC25A5F973}"/>
+              </a:ext>
+            </a:extLst>
+          </p:cNvPr>
+          <p:cNvSpPr>
+            <a:spLocks noGrp="1"/>
+          </p:cNvSpPr>
+          <p:nvPr>
+            <p:ph idx="1"/>
+          </p:nvPr>
+        </p:nvSpPr>
+        <p:spPr/>
         <p:txBody>
           <a:bodyPr>
             <a:normAutofit/>
@@ -3523,76 +3589,30 @@
           <a:lstStyle/>
           <a:p>
             <a:r>
-              <a:rPr lang="en-AU" dirty="0" smtClean="0"/>
-              <a:t>Live Demo</a:t>
-            </a:r>
-            <a:endParaRPr lang="en-AU" sz="4400" dirty="0"/>
-          </a:p>
-        </p:txBody>
-      </p:sp>
-      <p:sp>
-        <p:nvSpPr>
-          <p:cNvPr id="4" name="Content Placeholder 3"/>
-          <p:cNvSpPr>
-            <a:spLocks noGrp="1"/>
-          </p:cNvSpPr>
-          <p:nvPr>
-            <p:ph idx="1"/>
-          </p:nvPr>
-        </p:nvSpPr>
-        <p:spPr/>
-        <p:txBody>
-          <a:bodyPr/>
-          <a:lstStyle/>
-          <a:p>
-            <a:r>
-              <a:rPr lang="en-US" dirty="0"/>
-              <a:t>S</a:t>
-            </a:r>
-            <a:r>
-              <a:rPr lang="en-US" dirty="0" smtClean="0"/>
-              <a:t>how the app</a:t>
-            </a:r>
-          </a:p>
-          <a:p>
-            <a:r>
-              <a:rPr lang="en-US" dirty="0" smtClean="0"/>
-              <a:t>S</a:t>
-            </a:r>
-            <a:r>
-              <a:rPr lang="en-US" dirty="0" smtClean="0"/>
-              <a:t>tring on sets</a:t>
-            </a:r>
-          </a:p>
-          <a:p>
-            <a:r>
-              <a:rPr lang="en-US" dirty="0" smtClean="0"/>
-              <a:t>S</a:t>
-            </a:r>
-            <a:r>
-              <a:rPr lang="en-US" dirty="0" smtClean="0"/>
-              <a:t>tring on weights</a:t>
-            </a:r>
-          </a:p>
-          <a:p>
-            <a:r>
-              <a:rPr lang="en-US" dirty="0" smtClean="0"/>
-              <a:t>S</a:t>
-            </a:r>
-            <a:r>
-              <a:rPr lang="en-US" dirty="0" smtClean="0"/>
-              <a:t>tring on reps</a:t>
-            </a:r>
-          </a:p>
-          <a:p>
-            <a:endParaRPr lang="en-US" dirty="0"/>
+              <a:rPr lang="en-AU" sz="2800" dirty="0"/>
+              <a:t>Fork and clone repository ‘https://github.com/markconanan/</a:t>
+            </a:r>
+            <a:r>
+              <a:rPr lang="en-AU" sz="2800" dirty="0" err="1"/>
+              <a:t>CA_Assessment</a:t>
+            </a:r>
+            <a:r>
+              <a:rPr lang="en-AU" sz="2800" dirty="0"/>
+              <a:t>’</a:t>
+            </a:r>
+          </a:p>
+          <a:p>
+            <a:r>
+              <a:rPr lang="en-AU" sz="2800" dirty="0"/>
+              <a:t>Need to install ‘terminal-table’ gem</a:t>
+            </a:r>
           </a:p>
         </p:txBody>
       </p:sp>
     </p:spTree>
     <p:extLst>
       <p:ext uri="{BB962C8B-B14F-4D97-AF65-F5344CB8AC3E}">
-        <p14:creationId xmlns:p14="http://schemas.microsoft.com/office/powerpoint/2010/main" val="2710925473"/>
+        <p14:creationId xmlns:p14="http://schemas.microsoft.com/office/powerpoint/2010/main" val="2273243620"/>
       </p:ext>
     </p:extLst>
   </p:cSld>
@@ -3621,7 +3641,13 @@
       </p:grpSpPr>
       <p:sp>
         <p:nvSpPr>
-          <p:cNvPr id="2" name="Title 1"/>
+          <p:cNvPr id="2" name="Title 1">
+            <a:extLst>
+              <a:ext uri="{FF2B5EF4-FFF2-40B4-BE49-F238E27FC236}">
+                <a16:creationId xmlns="" xmlns:a16="http://schemas.microsoft.com/office/drawing/2014/main" id="{25788A04-8D3D-40BB-ACCE-661ADB19BE80}"/>
+              </a:ext>
+            </a:extLst>
+          </p:cNvPr>
           <p:cNvSpPr>
             <a:spLocks noGrp="1"/>
           </p:cNvSpPr>
@@ -3629,22 +3655,29 @@
             <p:ph type="title"/>
           </p:nvPr>
         </p:nvSpPr>
-        <p:spPr/>
-        <p:txBody>
-          <a:bodyPr/>
-          <a:lstStyle/>
-          <a:p>
-            <a:r>
-              <a:rPr lang="en-US" dirty="0" smtClean="0"/>
-              <a:t>Code Dive</a:t>
-            </a:r>
-            <a:endParaRPr lang="en-US" dirty="0"/>
-          </a:p>
-        </p:txBody>
-      </p:sp>
-      <p:sp>
-        <p:nvSpPr>
-          <p:cNvPr id="3" name="Content Placeholder 2"/>
+        <p:spPr>
+          <a:xfrm>
+            <a:off x="913774" y="0"/>
+            <a:ext cx="10364451" cy="1596177"/>
+          </a:xfrm>
+        </p:spPr>
+        <p:txBody>
+          <a:bodyPr>
+            <a:normAutofit/>
+          </a:bodyPr>
+          <a:lstStyle/>
+          <a:p>
+            <a:r>
+              <a:rPr lang="en-AU" dirty="0" smtClean="0"/>
+              <a:t>Live Demo</a:t>
+            </a:r>
+            <a:endParaRPr lang="en-AU" sz="4400" dirty="0"/>
+          </a:p>
+        </p:txBody>
+      </p:sp>
+      <p:sp>
+        <p:nvSpPr>
+          <p:cNvPr id="4" name="Content Placeholder 3"/>
           <p:cNvSpPr>
             <a:spLocks noGrp="1"/>
           </p:cNvSpPr>
@@ -3664,7 +3697,7 @@
     </p:spTree>
     <p:extLst>
       <p:ext uri="{BB962C8B-B14F-4D97-AF65-F5344CB8AC3E}">
-        <p14:creationId xmlns:p14="http://schemas.microsoft.com/office/powerpoint/2010/main" val="1482184971"/>
+        <p14:creationId xmlns:p14="http://schemas.microsoft.com/office/powerpoint/2010/main" val="2710925473"/>
       </p:ext>
     </p:extLst>
   </p:cSld>
@@ -3708,6 +3741,78 @@
           <a:p>
             <a:r>
               <a:rPr lang="en-US" dirty="0" smtClean="0"/>
+              <a:t>Code Dive</a:t>
+            </a:r>
+            <a:endParaRPr lang="en-US" dirty="0"/>
+          </a:p>
+        </p:txBody>
+      </p:sp>
+      <p:sp>
+        <p:nvSpPr>
+          <p:cNvPr id="3" name="Content Placeholder 2"/>
+          <p:cNvSpPr>
+            <a:spLocks noGrp="1"/>
+          </p:cNvSpPr>
+          <p:nvPr>
+            <p:ph idx="1"/>
+          </p:nvPr>
+        </p:nvSpPr>
+        <p:spPr/>
+        <p:txBody>
+          <a:bodyPr/>
+          <a:lstStyle/>
+          <a:p>
+            <a:endParaRPr lang="en-US" dirty="0"/>
+          </a:p>
+        </p:txBody>
+      </p:sp>
+    </p:spTree>
+    <p:extLst>
+      <p:ext uri="{BB962C8B-B14F-4D97-AF65-F5344CB8AC3E}">
+        <p14:creationId xmlns:p14="http://schemas.microsoft.com/office/powerpoint/2010/main" val="1482184971"/>
+      </p:ext>
+    </p:extLst>
+  </p:cSld>
+  <p:clrMapOvr>
+    <a:masterClrMapping/>
+  </p:clrMapOvr>
+</p:sld>
+</file>
+
+<file path=ppt/slides/slide8.xml><?xml version="1.0" encoding="utf-8"?>
+<p:sld xmlns:a="http://schemas.openxmlformats.org/drawingml/2006/main" xmlns:r="http://schemas.openxmlformats.org/officeDocument/2006/relationships" xmlns:p="http://schemas.openxmlformats.org/presentationml/2006/main">
+  <p:cSld>
+    <p:spTree>
+      <p:nvGrpSpPr>
+        <p:cNvPr id="1" name=""/>
+        <p:cNvGrpSpPr/>
+        <p:nvPr/>
+      </p:nvGrpSpPr>
+      <p:grpSpPr>
+        <a:xfrm>
+          <a:off x="0" y="0"/>
+          <a:ext cx="0" cy="0"/>
+          <a:chOff x="0" y="0"/>
+          <a:chExt cx="0" cy="0"/>
+        </a:xfrm>
+      </p:grpSpPr>
+      <p:sp>
+        <p:nvSpPr>
+          <p:cNvPr id="2" name="Title 1"/>
+          <p:cNvSpPr>
+            <a:spLocks noGrp="1"/>
+          </p:cNvSpPr>
+          <p:nvPr>
+            <p:ph type="title"/>
+          </p:nvPr>
+        </p:nvSpPr>
+        <p:spPr/>
+        <p:txBody>
+          <a:bodyPr/>
+          <a:lstStyle/>
+          <a:p>
+            <a:r>
+              <a:rPr lang="en-US" dirty="0" smtClean="0"/>
               <a:t>Future Improvements</a:t>
             </a:r>
             <a:endParaRPr lang="en-US" dirty="0"/>
@@ -3731,31 +3836,54 @@
           <a:p>
             <a:r>
               <a:rPr lang="en-US" dirty="0" smtClean="0"/>
-              <a:t>Be able to save logs and store it into the application</a:t>
-            </a:r>
-          </a:p>
-          <a:p>
+              <a:t>Option </a:t>
+            </a:r>
             <a:r>
               <a:rPr lang="en-US" dirty="0" smtClean="0"/>
-              <a:t>Be able to correct mistakes after input (back option)</a:t>
-            </a:r>
+              <a:t>to view history at the start of the application or proceed with the workout. </a:t>
+            </a:r>
+            <a:r>
+              <a:rPr lang="en-US" dirty="0"/>
+              <a:t>The app has already been coded to save history logs.</a:t>
+            </a:r>
+            <a:endParaRPr lang="en-US" dirty="0" smtClean="0"/>
           </a:p>
           <a:p>
             <a:r>
               <a:rPr lang="en-US" dirty="0" smtClean="0"/>
-              <a:t>Be able to record cardio exercises (running/swimming)</a:t>
-            </a:r>
-          </a:p>
-          <a:p>
+              <a:t>Be </a:t>
+            </a:r>
             <a:r>
               <a:rPr lang="en-US" dirty="0" smtClean="0"/>
-              <a:t>Option to put weights in pounds for American users</a:t>
+              <a:t>able to record cardio exercises (running/swimming)</a:t>
             </a:r>
           </a:p>
           <a:p>
             <a:r>
               <a:rPr lang="en-US" dirty="0" smtClean="0"/>
-              <a:t>Have a list of exercises and definitions</a:t>
+              <a:t>Option to </a:t>
+            </a:r>
+            <a:r>
+              <a:rPr lang="en-US" dirty="0" smtClean="0"/>
+              <a:t>put</a:t>
+            </a:r>
+            <a:r>
+              <a:rPr lang="en-US" dirty="0" smtClean="0"/>
+              <a:t> </a:t>
+            </a:r>
+            <a:r>
+              <a:rPr lang="en-US" dirty="0" smtClean="0"/>
+              <a:t>weights in pounds for American users</a:t>
+            </a:r>
+          </a:p>
+          <a:p>
+            <a:r>
+              <a:rPr lang="en-US" dirty="0" smtClean="0"/>
+              <a:t>Have a list of exercises and </a:t>
+            </a:r>
+            <a:r>
+              <a:rPr lang="en-US" dirty="0" smtClean="0"/>
+              <a:t>definitions for reference in the app</a:t>
             </a:r>
             <a:endParaRPr lang="en-US" dirty="0"/>
           </a:p>
@@ -3781,101 +3909,6 @@
 </p:sld>
 </file>
 
-<file path=ppt/slides/slide8.xml><?xml version="1.0" encoding="utf-8"?>
-<p:sld xmlns:a="http://schemas.openxmlformats.org/drawingml/2006/main" xmlns:r="http://schemas.openxmlformats.org/officeDocument/2006/relationships" xmlns:p="http://schemas.openxmlformats.org/presentationml/2006/main">
-  <p:cSld>
-    <p:spTree>
-      <p:nvGrpSpPr>
-        <p:cNvPr id="1" name=""/>
-        <p:cNvGrpSpPr/>
-        <p:nvPr/>
-      </p:nvGrpSpPr>
-      <p:grpSpPr>
-        <a:xfrm>
-          <a:off x="0" y="0"/>
-          <a:ext cx="0" cy="0"/>
-          <a:chOff x="0" y="0"/>
-          <a:chExt cx="0" cy="0"/>
-        </a:xfrm>
-      </p:grpSpPr>
-      <p:sp>
-        <p:nvSpPr>
-          <p:cNvPr id="2" name="Title 1"/>
-          <p:cNvSpPr>
-            <a:spLocks noGrp="1"/>
-          </p:cNvSpPr>
-          <p:nvPr>
-            <p:ph type="title"/>
-          </p:nvPr>
-        </p:nvSpPr>
-        <p:spPr/>
-        <p:txBody>
-          <a:bodyPr/>
-          <a:lstStyle/>
-          <a:p>
-            <a:r>
-              <a:rPr lang="en-US" dirty="0" smtClean="0"/>
-              <a:t>Challenges</a:t>
-            </a:r>
-            <a:endParaRPr lang="en-US" dirty="0"/>
-          </a:p>
-        </p:txBody>
-      </p:sp>
-      <p:sp>
-        <p:nvSpPr>
-          <p:cNvPr id="3" name="Content Placeholder 2"/>
-          <p:cNvSpPr>
-            <a:spLocks noGrp="1"/>
-          </p:cNvSpPr>
-          <p:nvPr>
-            <p:ph idx="1"/>
-          </p:nvPr>
-        </p:nvSpPr>
-        <p:spPr/>
-        <p:txBody>
-          <a:bodyPr/>
-          <a:lstStyle/>
-          <a:p>
-            <a:r>
-              <a:rPr lang="en-US" dirty="0" smtClean="0"/>
-              <a:t>Error handling </a:t>
-            </a:r>
-          </a:p>
-          <a:p>
-            <a:pPr lvl="1"/>
-            <a:r>
-              <a:rPr lang="en-US" dirty="0" smtClean="0"/>
-              <a:t>Limiting input to integers and floats </a:t>
-            </a:r>
-          </a:p>
-          <a:p>
-            <a:r>
-              <a:rPr lang="en-US" dirty="0" smtClean="0"/>
-              <a:t>Automated testing</a:t>
-            </a:r>
-          </a:p>
-          <a:p>
-            <a:pPr lvl="1"/>
-            <a:r>
-              <a:rPr lang="en-US" dirty="0" smtClean="0"/>
-              <a:t>Instance variables</a:t>
-            </a:r>
-          </a:p>
-        </p:txBody>
-      </p:sp>
-    </p:spTree>
-    <p:extLst>
-      <p:ext uri="{BB962C8B-B14F-4D97-AF65-F5344CB8AC3E}">
-        <p14:creationId xmlns:p14="http://schemas.microsoft.com/office/powerpoint/2010/main" val="2256724009"/>
-      </p:ext>
-    </p:extLst>
-  </p:cSld>
-  <p:clrMapOvr>
-    <a:masterClrMapping/>
-  </p:clrMapOvr>
-</p:sld>
-</file>
-
 <file path=ppt/slides/slide9.xml><?xml version="1.0" encoding="utf-8"?>
 <p:sld xmlns:a="http://schemas.openxmlformats.org/drawingml/2006/main" xmlns:r="http://schemas.openxmlformats.org/officeDocument/2006/relationships" xmlns:p="http://schemas.openxmlformats.org/presentationml/2006/main">
   <p:cSld>
@@ -3909,10 +3942,10 @@
           <a:lstStyle/>
           <a:p>
             <a:r>
-              <a:rPr lang="en-US" smtClean="0"/>
-              <a:t>Any Questions</a:t>
-            </a:r>
-            <a:endParaRPr lang="en-US"/>
+              <a:rPr lang="en-US" dirty="0" smtClean="0"/>
+              <a:t>Challenges</a:t>
+            </a:r>
+            <a:endParaRPr lang="en-US" dirty="0"/>
           </a:p>
         </p:txBody>
       </p:sp>
@@ -3931,14 +3964,48 @@
           <a:bodyPr/>
           <a:lstStyle/>
           <a:p>
-            <a:endParaRPr lang="en-US"/>
+            <a:r>
+              <a:rPr lang="en-US" dirty="0" smtClean="0"/>
+              <a:t>Refactoring </a:t>
+            </a:r>
+            <a:r>
+              <a:rPr lang="mr-IN" dirty="0" smtClean="0"/>
+              <a:t>–</a:t>
+            </a:r>
+            <a:r>
+              <a:rPr lang="en-US" dirty="0" smtClean="0"/>
+              <a:t> Methods and Classes</a:t>
+            </a:r>
+          </a:p>
+          <a:p>
+            <a:r>
+              <a:rPr lang="en-US" dirty="0" smtClean="0"/>
+              <a:t>Error </a:t>
+            </a:r>
+            <a:r>
+              <a:rPr lang="en-US" dirty="0" smtClean="0"/>
+              <a:t>handling </a:t>
+            </a:r>
+          </a:p>
+          <a:p>
+            <a:r>
+              <a:rPr lang="en-US" dirty="0" smtClean="0"/>
+              <a:t>Automated testing</a:t>
+            </a:r>
+          </a:p>
+          <a:p>
+            <a:r>
+              <a:rPr lang="en-US" dirty="0" smtClean="0"/>
+              <a:t>Control flow</a:t>
+            </a:r>
+            <a:endParaRPr lang="en-US" dirty="0" smtClean="0"/>
           </a:p>
         </p:txBody>
       </p:sp>
     </p:spTree>
     <p:extLst>
       <p:ext uri="{BB962C8B-B14F-4D97-AF65-F5344CB8AC3E}">
-        <p14:creationId xmlns:p14="http://schemas.microsoft.com/office/powerpoint/2010/main" val="2288286935"/>
+        <p14:creationId xmlns:p14="http://schemas.microsoft.com/office/powerpoint/2010/main" val="2256724009"/>
       </p:ext>
     </p:extLst>
   </p:cSld>

</xml_diff>